<commit_message>
Moved Hierarchy.gif and the UML diagrams to root folder of project.
</commit_message>
<xml_diff>
--- a/Texas Hold'em UML Diagram.pptx
+++ b/Texas Hold'em UML Diagram.pptx
@@ -6,8 +6,6 @@
   </p:sldMasterIdLst>
   <p:sldIdLst>
     <p:sldId id="256" r:id="rId2"/>
-    <p:sldId id="257" r:id="rId3"/>
-    <p:sldId id="258" r:id="rId4"/>
   </p:sldIdLst>
   <p:sldSz cx="9144000" cy="6858000" type="screen4x3"/>
   <p:notesSz cx="6858000" cy="9144000"/>
@@ -130,38 +128,6 @@
 <p1510:revInfo xmlns:a="http://schemas.openxmlformats.org/drawingml/2006/main" xmlns:r="http://schemas.openxmlformats.org/officeDocument/2006/relationships" xmlns:p1510="http://schemas.microsoft.com/office/powerpoint/2015/10/main"/>
 </file>
 
-<file path=ppt/comments/comment1.xml><?xml version="1.0" encoding="utf-8"?>
-<p:cmLst xmlns:a="http://schemas.openxmlformats.org/drawingml/2006/main" xmlns:r="http://schemas.openxmlformats.org/officeDocument/2006/relationships" xmlns:p="http://schemas.openxmlformats.org/presentationml/2006/main">
-  <p:cm authorId="1" dt="2017-09-26T18:42:52.786" idx="3">
-    <p:pos x="5117" y="643"/>
-    <p:text>I don'r we need a shuffle...  If we make cards an enum, I saw there was a way to utilize random; which is technecially shuffling</p:text>
-    <p:extLst>
-      <p:ext uri="{C676402C-5697-4E1C-873F-D02D1690AC5C}">
-        <p15:threadingInfo xmlns:p15="http://schemas.microsoft.com/office/powerpoint/2012/main" timeZoneBias="240"/>
-      </p:ext>
-    </p:extLst>
-  </p:cm>
-  <p:cm authorId="1" dt="2017-09-26T18:43:57.231" idx="4">
-    <p:pos x="1062" y="302"/>
-    <p:text>We need a player count becuase if there is only one player left, then cards have to be revealed.</p:text>
-    <p:extLst>
-      <p:ext uri="{C676402C-5697-4E1C-873F-D02D1690AC5C}">
-        <p15:threadingInfo xmlns:p15="http://schemas.microsoft.com/office/powerpoint/2012/main" timeZoneBias="240"/>
-      </p:ext>
-    </p:extLst>
-  </p:cm>
-  <p:cm authorId="1" dt="2017-09-26T18:44:41.340" idx="5">
-    <p:pos x="4877" y="1713"/>
-    <p:text>I took reveal out of here because if we really think about it, reveal is an action that comes at the very end of the game, which is why I threw it into action</p:text>
-    <p:extLst>
-      <p:ext uri="{C676402C-5697-4E1C-873F-D02D1690AC5C}">
-        <p15:threadingInfo xmlns:p15="http://schemas.microsoft.com/office/powerpoint/2012/main" timeZoneBias="240"/>
-      </p:ext>
-    </p:extLst>
-  </p:cm>
-</p:cmLst>
-</file>
-
 <file path=ppt/slideLayouts/slideLayout1.xml><?xml version="1.0" encoding="utf-8"?>
 <p:sldLayout xmlns:a="http://schemas.openxmlformats.org/drawingml/2006/main" xmlns:r="http://schemas.openxmlformats.org/officeDocument/2006/relationships" xmlns:p="http://schemas.openxmlformats.org/presentationml/2006/main" type="title" preserve="1">
   <p:cSld name="Title Slide">
@@ -293,7 +259,7 @@
           <a:p>
             <a:fld id="{A6026E4B-DA79-4DA3-88A8-510114CE61D4}" type="datetimeFigureOut">
               <a:rPr lang="en-US" smtClean="0"/>
-              <a:t>10/16/2017</a:t>
+              <a:t>10/17/2017</a:t>
             </a:fld>
             <a:endParaRPr lang="en-US"/>
           </a:p>
@@ -463,7 +429,7 @@
           <a:p>
             <a:fld id="{A6026E4B-DA79-4DA3-88A8-510114CE61D4}" type="datetimeFigureOut">
               <a:rPr lang="en-US" smtClean="0"/>
-              <a:t>10/16/2017</a:t>
+              <a:t>10/17/2017</a:t>
             </a:fld>
             <a:endParaRPr lang="en-US"/>
           </a:p>
@@ -643,7 +609,7 @@
           <a:p>
             <a:fld id="{A6026E4B-DA79-4DA3-88A8-510114CE61D4}" type="datetimeFigureOut">
               <a:rPr lang="en-US" smtClean="0"/>
-              <a:t>10/16/2017</a:t>
+              <a:t>10/17/2017</a:t>
             </a:fld>
             <a:endParaRPr lang="en-US"/>
           </a:p>
@@ -813,7 +779,7 @@
           <a:p>
             <a:fld id="{A6026E4B-DA79-4DA3-88A8-510114CE61D4}" type="datetimeFigureOut">
               <a:rPr lang="en-US" smtClean="0"/>
-              <a:t>10/16/2017</a:t>
+              <a:t>10/17/2017</a:t>
             </a:fld>
             <a:endParaRPr lang="en-US"/>
           </a:p>
@@ -1057,7 +1023,7 @@
           <a:p>
             <a:fld id="{A6026E4B-DA79-4DA3-88A8-510114CE61D4}" type="datetimeFigureOut">
               <a:rPr lang="en-US" smtClean="0"/>
-              <a:t>10/16/2017</a:t>
+              <a:t>10/17/2017</a:t>
             </a:fld>
             <a:endParaRPr lang="en-US"/>
           </a:p>
@@ -1289,7 +1255,7 @@
           <a:p>
             <a:fld id="{A6026E4B-DA79-4DA3-88A8-510114CE61D4}" type="datetimeFigureOut">
               <a:rPr lang="en-US" smtClean="0"/>
-              <a:t>10/16/2017</a:t>
+              <a:t>10/17/2017</a:t>
             </a:fld>
             <a:endParaRPr lang="en-US"/>
           </a:p>
@@ -1656,7 +1622,7 @@
           <a:p>
             <a:fld id="{A6026E4B-DA79-4DA3-88A8-510114CE61D4}" type="datetimeFigureOut">
               <a:rPr lang="en-US" smtClean="0"/>
-              <a:t>10/16/2017</a:t>
+              <a:t>10/17/2017</a:t>
             </a:fld>
             <a:endParaRPr lang="en-US"/>
           </a:p>
@@ -1774,7 +1740,7 @@
           <a:p>
             <a:fld id="{A6026E4B-DA79-4DA3-88A8-510114CE61D4}" type="datetimeFigureOut">
               <a:rPr lang="en-US" smtClean="0"/>
-              <a:t>10/16/2017</a:t>
+              <a:t>10/17/2017</a:t>
             </a:fld>
             <a:endParaRPr lang="en-US"/>
           </a:p>
@@ -1869,7 +1835,7 @@
           <a:p>
             <a:fld id="{A6026E4B-DA79-4DA3-88A8-510114CE61D4}" type="datetimeFigureOut">
               <a:rPr lang="en-US" smtClean="0"/>
-              <a:t>10/16/2017</a:t>
+              <a:t>10/17/2017</a:t>
             </a:fld>
             <a:endParaRPr lang="en-US"/>
           </a:p>
@@ -2146,7 +2112,7 @@
           <a:p>
             <a:fld id="{A6026E4B-DA79-4DA3-88A8-510114CE61D4}" type="datetimeFigureOut">
               <a:rPr lang="en-US" smtClean="0"/>
-              <a:t>10/16/2017</a:t>
+              <a:t>10/17/2017</a:t>
             </a:fld>
             <a:endParaRPr lang="en-US"/>
           </a:p>
@@ -2403,7 +2369,7 @@
           <a:p>
             <a:fld id="{A6026E4B-DA79-4DA3-88A8-510114CE61D4}" type="datetimeFigureOut">
               <a:rPr lang="en-US" smtClean="0"/>
-              <a:t>10/16/2017</a:t>
+              <a:t>10/17/2017</a:t>
             </a:fld>
             <a:endParaRPr lang="en-US"/>
           </a:p>
@@ -2616,7 +2582,7 @@
           <a:p>
             <a:fld id="{A6026E4B-DA79-4DA3-88A8-510114CE61D4}" type="datetimeFigureOut">
               <a:rPr lang="en-US" smtClean="0"/>
-              <a:t>10/16/2017</a:t>
+              <a:t>10/17/2017</a:t>
             </a:fld>
             <a:endParaRPr lang="en-US"/>
           </a:p>
@@ -3036,14 +3002,14 @@
           <p:nvPr>
             <p:extLst>
               <p:ext uri="{D42A27DB-BD31-4B8C-83A1-F6EECF244321}">
-                <p14:modId xmlns:p14="http://schemas.microsoft.com/office/powerpoint/2010/main" val="2391579025"/>
+                <p14:modId xmlns:p14="http://schemas.microsoft.com/office/powerpoint/2010/main" val="3694464752"/>
               </p:ext>
             </p:extLst>
           </p:nvPr>
         </p:nvGraphicFramePr>
         <p:xfrm>
-          <a:off x="3378130" y="4093879"/>
-          <a:ext cx="2111566" cy="2590800"/>
+          <a:off x="375671" y="3567370"/>
+          <a:ext cx="2189798" cy="2590800"/>
         </p:xfrm>
         <a:graphic>
           <a:graphicData uri="http://schemas.openxmlformats.org/drawingml/2006/table">
@@ -3052,7 +3018,7 @@
                 <a:tableStyleId>{5C22544A-7EE6-4342-B048-85BDC9FD1C3A}</a:tableStyleId>
               </a:tblPr>
               <a:tblGrid>
-                <a:gridCol w="2111566">
+                <a:gridCol w="2189798">
                   <a:extLst>
                     <a:ext uri="{9D8B030D-6E8A-4147-A177-3AD203B41FA5}">
                       <a16:colId xmlns:a16="http://schemas.microsoft.com/office/drawing/2014/main" val="997862604"/>
@@ -3082,7 +3048,7 @@
                           <a:latin typeface="Courier New" panose="02070309020205020404" pitchFamily="49" charset="0"/>
                           <a:cs typeface="Courier New" panose="02070309020205020404" pitchFamily="49" charset="0"/>
                         </a:rPr>
-                        <a:t>USER</a:t>
+                        <a:t>Player</a:t>
                       </a:r>
                     </a:p>
                   </a:txBody>
@@ -3287,23 +3253,30 @@
                     <a:bodyPr/>
                     <a:lstStyle/>
                     <a:p>
-                      <a:pPr marL="171450" indent="-171450">
+                      <a:pPr marL="0" indent="0">
                         <a:buFontTx/>
-                        <a:buChar char="-"/>
+                        <a:buNone/>
                       </a:pPr>
                       <a:r>
                         <a:rPr lang="en-US" sz="1200" dirty="0">
                           <a:latin typeface="Courier New" panose="02070309020205020404" pitchFamily="49" charset="0"/>
                           <a:cs typeface="Courier New" panose="02070309020205020404" pitchFamily="49" charset="0"/>
                         </a:rPr>
-                        <a:t>display():void</a:t>
+                        <a:t>+ display():void</a:t>
                       </a:r>
                     </a:p>
                     <a:p>
-                      <a:pPr marL="171450" indent="-171450">
+                      <a:pPr marL="0" indent="0">
                         <a:buFontTx/>
-                        <a:buChar char="-"/>
+                        <a:buNone/>
                       </a:pPr>
+                      <a:r>
+                        <a:rPr lang="en-US" sz="1200" dirty="0">
+                          <a:latin typeface="Courier New" panose="02070309020205020404" pitchFamily="49" charset="0"/>
+                          <a:cs typeface="Courier New" panose="02070309020205020404" pitchFamily="49" charset="0"/>
+                        </a:rPr>
+                        <a:t>+ </a:t>
+                      </a:r>
                       <a:r>
                         <a:rPr lang="en-US" sz="1200" dirty="0" err="1">
                           <a:latin typeface="Courier New" panose="02070309020205020404" pitchFamily="49" charset="0"/>
@@ -3320,10 +3293,17 @@
                       </a:r>
                     </a:p>
                     <a:p>
-                      <a:pPr marL="171450" indent="-171450">
+                      <a:pPr marL="0" indent="0">
                         <a:buFontTx/>
-                        <a:buChar char="-"/>
+                        <a:buNone/>
                       </a:pPr>
+                      <a:r>
+                        <a:rPr lang="en-US" sz="1200" dirty="0">
+                          <a:latin typeface="Courier New" panose="02070309020205020404" pitchFamily="49" charset="0"/>
+                          <a:cs typeface="Courier New" panose="02070309020205020404" pitchFamily="49" charset="0"/>
+                        </a:rPr>
+                        <a:t>+ </a:t>
+                      </a:r>
                       <a:r>
                         <a:rPr lang="en-US" sz="1200" dirty="0" err="1">
                           <a:latin typeface="Courier New" panose="02070309020205020404" pitchFamily="49" charset="0"/>
@@ -3340,10 +3320,17 @@
                       </a:r>
                     </a:p>
                     <a:p>
-                      <a:pPr marL="171450" indent="-171450">
+                      <a:pPr marL="0" indent="0">
                         <a:buFontTx/>
-                        <a:buChar char="-"/>
+                        <a:buNone/>
                       </a:pPr>
+                      <a:r>
+                        <a:rPr lang="en-US" sz="1200" dirty="0">
+                          <a:latin typeface="Courier New" panose="02070309020205020404" pitchFamily="49" charset="0"/>
+                          <a:cs typeface="Courier New" panose="02070309020205020404" pitchFamily="49" charset="0"/>
+                        </a:rPr>
+                        <a:t>+ </a:t>
+                      </a:r>
                       <a:r>
                         <a:rPr lang="en-US" sz="1200" dirty="0" err="1">
                           <a:latin typeface="Courier New" panose="02070309020205020404" pitchFamily="49" charset="0"/>
@@ -3360,23 +3347,44 @@
                       </a:r>
                     </a:p>
                     <a:p>
-                      <a:pPr marL="171450" indent="-171450">
+                      <a:pPr marL="0" indent="0">
                         <a:buFontTx/>
-                        <a:buChar char="-"/>
+                        <a:buNone/>
                       </a:pPr>
                       <a:r>
                         <a:rPr lang="en-US" sz="1200" dirty="0">
                           <a:latin typeface="Courier New" panose="02070309020205020404" pitchFamily="49" charset="0"/>
                           <a:cs typeface="Courier New" panose="02070309020205020404" pitchFamily="49" charset="0"/>
                         </a:rPr>
-                        <a:t>balance():int</a:t>
+                        <a:t>+ </a:t>
+                      </a:r>
+                      <a:r>
+                        <a:rPr lang="en-US" sz="1200" dirty="0" err="1">
+                          <a:latin typeface="Courier New" panose="02070309020205020404" pitchFamily="49" charset="0"/>
+                          <a:cs typeface="Courier New" panose="02070309020205020404" pitchFamily="49" charset="0"/>
+                        </a:rPr>
+                        <a:t>getBalance</a:t>
+                      </a:r>
+                      <a:r>
+                        <a:rPr lang="en-US" sz="1200" dirty="0">
+                          <a:latin typeface="Courier New" panose="02070309020205020404" pitchFamily="49" charset="0"/>
+                          <a:cs typeface="Courier New" panose="02070309020205020404" pitchFamily="49" charset="0"/>
+                        </a:rPr>
+                        <a:t>():int</a:t>
                       </a:r>
                     </a:p>
                     <a:p>
-                      <a:pPr marL="171450" indent="-171450">
+                      <a:pPr marL="0" indent="0">
                         <a:buFontTx/>
-                        <a:buChar char="-"/>
+                        <a:buNone/>
                       </a:pPr>
+                      <a:r>
+                        <a:rPr lang="en-US" sz="1200" dirty="0">
+                          <a:latin typeface="Courier New" panose="02070309020205020404" pitchFamily="49" charset="0"/>
+                          <a:cs typeface="Courier New" panose="02070309020205020404" pitchFamily="49" charset="0"/>
+                        </a:rPr>
+                        <a:t>+ </a:t>
+                      </a:r>
                       <a:r>
                         <a:rPr lang="en-US" sz="1200" dirty="0" err="1">
                           <a:latin typeface="Courier New" panose="02070309020205020404" pitchFamily="49" charset="0"/>
@@ -3468,13 +3476,13 @@
           <p:nvPr>
             <p:extLst>
               <p:ext uri="{D42A27DB-BD31-4B8C-83A1-F6EECF244321}">
-                <p14:modId xmlns:p14="http://schemas.microsoft.com/office/powerpoint/2010/main" val="4282182210"/>
+                <p14:modId xmlns:p14="http://schemas.microsoft.com/office/powerpoint/2010/main" val="2154544791"/>
               </p:ext>
             </p:extLst>
           </p:nvPr>
         </p:nvGraphicFramePr>
         <p:xfrm>
-          <a:off x="6477918" y="2280423"/>
+          <a:off x="6430138" y="2436533"/>
           <a:ext cx="2111566" cy="1201661"/>
         </p:xfrm>
         <a:graphic>
@@ -3753,14 +3761,14 @@
           <p:nvPr>
             <p:extLst>
               <p:ext uri="{D42A27DB-BD31-4B8C-83A1-F6EECF244321}">
-                <p14:modId xmlns:p14="http://schemas.microsoft.com/office/powerpoint/2010/main" val="2142162376"/>
+                <p14:modId xmlns:p14="http://schemas.microsoft.com/office/powerpoint/2010/main" val="3729459435"/>
               </p:ext>
             </p:extLst>
           </p:nvPr>
         </p:nvGraphicFramePr>
         <p:xfrm>
           <a:off x="6477918" y="253388"/>
-          <a:ext cx="2111566" cy="1244905"/>
+          <a:ext cx="2111566" cy="1371232"/>
         </p:xfrm>
         <a:graphic>
           <a:graphicData uri="http://schemas.openxmlformats.org/drawingml/2006/table">
@@ -3874,8 +3882,25 @@
                           <a:latin typeface="Courier New" panose="02070309020205020404" pitchFamily="49" charset="0"/>
                           <a:cs typeface="Courier New" panose="02070309020205020404" pitchFamily="49" charset="0"/>
                         </a:rPr>
-                        <a:t>cards</a:t>
-                      </a:r>
+                        <a:t>Cards</a:t>
+                      </a:r>
+                    </a:p>
+                    <a:p>
+                      <a:pPr marL="171450" indent="-171450">
+                        <a:buFontTx/>
+                        <a:buChar char="-"/>
+                      </a:pPr>
+                      <a:r>
+                        <a:rPr lang="en-US" sz="1200" dirty="0" err="1">
+                          <a:latin typeface="Courier New" panose="02070309020205020404" pitchFamily="49" charset="0"/>
+                          <a:cs typeface="Courier New" panose="02070309020205020404" pitchFamily="49" charset="0"/>
+                        </a:rPr>
+                        <a:t>usedCards</a:t>
+                      </a:r>
+                      <a:endParaRPr lang="en-US" sz="1200" dirty="0">
+                        <a:latin typeface="Courier New" panose="02070309020205020404" pitchFamily="49" charset="0"/>
+                        <a:cs typeface="Courier New" panose="02070309020205020404" pitchFamily="49" charset="0"/>
+                      </a:endParaRPr>
                     </a:p>
                   </a:txBody>
                   <a:tcPr>
@@ -3940,640 +3965,43 @@
                     <a:bodyPr/>
                     <a:lstStyle/>
                     <a:p>
-                      <a:pPr marL="171450" indent="-171450">
+                      <a:pPr marL="0" indent="0">
                         <a:buFontTx/>
-                        <a:buChar char="-"/>
+                        <a:buNone/>
                       </a:pPr>
                       <a:r>
                         <a:rPr lang="en-US" sz="1200" dirty="0">
                           <a:latin typeface="Courier New" panose="02070309020205020404" pitchFamily="49" charset="0"/>
                           <a:cs typeface="Courier New" panose="02070309020205020404" pitchFamily="49" charset="0"/>
                         </a:rPr>
-                        <a:t>shuffle():void</a:t>
+                        <a:t>+ shuffle():void</a:t>
                       </a:r>
                     </a:p>
                     <a:p>
-                      <a:pPr marL="171450" indent="-171450">
+                      <a:pPr marL="0" indent="0">
                         <a:buFontTx/>
-                        <a:buChar char="-"/>
+                        <a:buNone/>
                       </a:pPr>
                       <a:r>
                         <a:rPr lang="en-US" sz="1200" dirty="0">
                           <a:latin typeface="Courier New" panose="02070309020205020404" pitchFamily="49" charset="0"/>
                           <a:cs typeface="Courier New" panose="02070309020205020404" pitchFamily="49" charset="0"/>
                         </a:rPr>
-                        <a:t>deal()</a:t>
-                      </a:r>
-                    </a:p>
-                  </a:txBody>
-                  <a:tcPr>
-                    <a:lnL w="12700" cap="flat" cmpd="sng" algn="ctr">
-                      <a:solidFill>
-                        <a:schemeClr val="tx1"/>
-                      </a:solidFill>
-                      <a:prstDash val="solid"/>
-                      <a:round/>
-                      <a:headEnd type="none" w="med" len="med"/>
-                      <a:tailEnd type="none" w="med" len="med"/>
-                    </a:lnL>
-                    <a:lnR w="12700" cap="flat" cmpd="sng" algn="ctr">
-                      <a:solidFill>
-                        <a:schemeClr val="tx1"/>
-                      </a:solidFill>
-                      <a:prstDash val="solid"/>
-                      <a:round/>
-                      <a:headEnd type="none" w="med" len="med"/>
-                      <a:tailEnd type="none" w="med" len="med"/>
-                    </a:lnR>
-                    <a:lnT w="12700" cap="flat" cmpd="sng" algn="ctr">
-                      <a:solidFill>
-                        <a:schemeClr val="tx1"/>
-                      </a:solidFill>
-                      <a:prstDash val="solid"/>
-                      <a:round/>
-                      <a:headEnd type="none" w="med" len="med"/>
-                      <a:tailEnd type="none" w="med" len="med"/>
-                    </a:lnT>
-                    <a:lnB w="12700" cap="flat" cmpd="sng" algn="ctr">
-                      <a:solidFill>
-                        <a:schemeClr val="tx1"/>
-                      </a:solidFill>
-                      <a:prstDash val="solid"/>
-                      <a:round/>
-                      <a:headEnd type="none" w="med" len="med"/>
-                      <a:tailEnd type="none" w="med" len="med"/>
-                    </a:lnB>
-                    <a:lnTlToBr w="12700" cmpd="sng">
-                      <a:noFill/>
-                      <a:prstDash val="solid"/>
-                    </a:lnTlToBr>
-                    <a:lnBlToTr w="12700" cmpd="sng">
-                      <a:noFill/>
-                      <a:prstDash val="solid"/>
-                    </a:lnBlToTr>
-                    <a:solidFill>
-                      <a:schemeClr val="bg1"/>
-                    </a:solidFill>
-                  </a:tcPr>
-                </a:tc>
-                <a:extLst>
-                  <a:ext uri="{0D108BD9-81ED-4DB2-BD59-A6C34878D82A}">
-                    <a16:rowId xmlns:a16="http://schemas.microsoft.com/office/drawing/2014/main" val="3006850946"/>
-                  </a:ext>
-                </a:extLst>
-              </a:tr>
-            </a:tbl>
-          </a:graphicData>
-        </a:graphic>
-      </p:graphicFrame>
-      <p:graphicFrame>
-        <p:nvGraphicFramePr>
-          <p:cNvPr id="8" name="Table 7">
-            <a:extLst>
-              <a:ext uri="{FF2B5EF4-FFF2-40B4-BE49-F238E27FC236}">
-                <a16:creationId xmlns:a16="http://schemas.microsoft.com/office/drawing/2014/main" id="{6BCF8508-83C4-4965-AEB4-97B552CE5364}"/>
-              </a:ext>
-            </a:extLst>
-          </p:cNvPr>
-          <p:cNvGraphicFramePr>
-            <a:graphicFrameLocks noGrp="1"/>
-          </p:cNvGraphicFramePr>
-          <p:nvPr>
-            <p:extLst>
-              <p:ext uri="{D42A27DB-BD31-4B8C-83A1-F6EECF244321}">
-                <p14:modId xmlns:p14="http://schemas.microsoft.com/office/powerpoint/2010/main" val="189324354"/>
-              </p:ext>
-            </p:extLst>
-          </p:nvPr>
-        </p:nvGraphicFramePr>
-        <p:xfrm>
-          <a:off x="253511" y="2320518"/>
-          <a:ext cx="2111566" cy="4377002"/>
-        </p:xfrm>
-        <a:graphic>
-          <a:graphicData uri="http://schemas.openxmlformats.org/drawingml/2006/table">
-            <a:tbl>
-              <a:tblPr firstRow="1" bandRow="1">
-                <a:tableStyleId>{5C22544A-7EE6-4342-B048-85BDC9FD1C3A}</a:tableStyleId>
-              </a:tblPr>
-              <a:tblGrid>
-                <a:gridCol w="2111566">
-                  <a:extLst>
-                    <a:ext uri="{9D8B030D-6E8A-4147-A177-3AD203B41FA5}">
-                      <a16:colId xmlns:a16="http://schemas.microsoft.com/office/drawing/2014/main" val="997862604"/>
-                    </a:ext>
-                  </a:extLst>
-                </a:gridCol>
-              </a:tblGrid>
-              <a:tr h="467019">
-                <a:tc>
-                  <a:txBody>
-                    <a:bodyPr/>
-                    <a:lstStyle/>
-                    <a:p>
-                      <a:pPr algn="ctr"/>
-                      <a:r>
-                        <a:rPr lang="en-US" sz="2000" dirty="0">
-                          <a:solidFill>
-                            <a:srgbClr val="C00000"/>
-                          </a:solidFill>
-                          <a:effectLst>
-                            <a:outerShdw blurRad="38100" dist="38100" dir="2700000" algn="tl">
-                              <a:srgbClr val="000000">
-                                <a:alpha val="43137"/>
-                              </a:srgbClr>
-                            </a:outerShdw>
-                          </a:effectLst>
-                          <a:latin typeface="Courier New" panose="02070309020205020404" pitchFamily="49" charset="0"/>
-                          <a:cs typeface="Courier New" panose="02070309020205020404" pitchFamily="49" charset="0"/>
-                        </a:rPr>
-                        <a:t>WINNER</a:t>
-                      </a:r>
-                    </a:p>
-                  </a:txBody>
-                  <a:tcPr>
-                    <a:lnL w="12700" cap="flat" cmpd="sng" algn="ctr">
-                      <a:solidFill>
-                        <a:schemeClr val="tx1"/>
-                      </a:solidFill>
-                      <a:prstDash val="solid"/>
-                      <a:round/>
-                      <a:headEnd type="none" w="med" len="med"/>
-                      <a:tailEnd type="none" w="med" len="med"/>
-                    </a:lnL>
-                    <a:lnR w="12700" cap="flat" cmpd="sng" algn="ctr">
-                      <a:solidFill>
-                        <a:schemeClr val="tx1"/>
-                      </a:solidFill>
-                      <a:prstDash val="solid"/>
-                      <a:round/>
-                      <a:headEnd type="none" w="med" len="med"/>
-                      <a:tailEnd type="none" w="med" len="med"/>
-                    </a:lnR>
-                    <a:lnT w="12700" cap="flat" cmpd="sng" algn="ctr">
-                      <a:solidFill>
-                        <a:schemeClr val="tx1"/>
-                      </a:solidFill>
-                      <a:prstDash val="solid"/>
-                      <a:round/>
-                      <a:headEnd type="none" w="med" len="med"/>
-                      <a:tailEnd type="none" w="med" len="med"/>
-                    </a:lnT>
-                    <a:lnB w="12700" cap="flat" cmpd="sng" algn="ctr">
-                      <a:solidFill>
-                        <a:schemeClr val="tx1"/>
-                      </a:solidFill>
-                      <a:prstDash val="solid"/>
-                      <a:round/>
-                      <a:headEnd type="none" w="med" len="med"/>
-                      <a:tailEnd type="none" w="med" len="med"/>
-                    </a:lnB>
-                    <a:lnTlToBr w="12700" cmpd="sng">
-                      <a:noFill/>
-                      <a:prstDash val="solid"/>
-                    </a:lnTlToBr>
-                    <a:lnBlToTr w="12700" cmpd="sng">
-                      <a:noFill/>
-                      <a:prstDash val="solid"/>
-                    </a:lnBlToTr>
-                    <a:solidFill>
-                      <a:schemeClr val="bg1"/>
-                    </a:solidFill>
-                  </a:tcPr>
-                </a:tc>
-                <a:extLst>
-                  <a:ext uri="{0D108BD9-81ED-4DB2-BD59-A6C34878D82A}">
-                    <a16:rowId xmlns:a16="http://schemas.microsoft.com/office/drawing/2014/main" val="797393700"/>
-                  </a:ext>
-                </a:extLst>
-              </a:tr>
-              <a:tr h="1989743">
-                <a:tc>
-                  <a:txBody>
-                    <a:bodyPr/>
-                    <a:lstStyle/>
-                    <a:p>
-                      <a:pPr marL="171450" indent="-171450">
-                        <a:buFontTx/>
-                        <a:buChar char="-"/>
-                      </a:pPr>
+                        <a:t>+ </a:t>
+                      </a:r>
                       <a:r>
                         <a:rPr lang="en-US" sz="1200" dirty="0" err="1">
                           <a:latin typeface="Courier New" panose="02070309020205020404" pitchFamily="49" charset="0"/>
                           <a:cs typeface="Courier New" panose="02070309020205020404" pitchFamily="49" charset="0"/>
                         </a:rPr>
-                        <a:t>noPair</a:t>
-                      </a:r>
-                      <a:endParaRPr lang="en-US" sz="1200" dirty="0">
-                        <a:latin typeface="Courier New" panose="02070309020205020404" pitchFamily="49" charset="0"/>
-                        <a:cs typeface="Courier New" panose="02070309020205020404" pitchFamily="49" charset="0"/>
-                      </a:endParaRPr>
-                    </a:p>
-                    <a:p>
-                      <a:pPr marL="171450" indent="-171450">
-                        <a:buFontTx/>
-                        <a:buChar char="-"/>
-                      </a:pPr>
-                      <a:r>
-                        <a:rPr lang="en-US" sz="1200" dirty="0" err="1">
-                          <a:latin typeface="Courier New" panose="02070309020205020404" pitchFamily="49" charset="0"/>
-                          <a:cs typeface="Courier New" panose="02070309020205020404" pitchFamily="49" charset="0"/>
-                        </a:rPr>
-                        <a:t>onePair</a:t>
-                      </a:r>
-                      <a:endParaRPr lang="en-US" sz="1200" dirty="0">
-                        <a:latin typeface="Courier New" panose="02070309020205020404" pitchFamily="49" charset="0"/>
-                        <a:cs typeface="Courier New" panose="02070309020205020404" pitchFamily="49" charset="0"/>
-                      </a:endParaRPr>
-                    </a:p>
-                    <a:p>
-                      <a:pPr marL="171450" indent="-171450">
-                        <a:buFontTx/>
-                        <a:buChar char="-"/>
-                      </a:pPr>
-                      <a:r>
-                        <a:rPr lang="en-US" sz="1200" dirty="0" err="1">
-                          <a:latin typeface="Courier New" panose="02070309020205020404" pitchFamily="49" charset="0"/>
-                          <a:cs typeface="Courier New" panose="02070309020205020404" pitchFamily="49" charset="0"/>
-                        </a:rPr>
-                        <a:t>twoPairs</a:t>
-                      </a:r>
-                      <a:endParaRPr lang="en-US" sz="1200" dirty="0">
-                        <a:latin typeface="Courier New" panose="02070309020205020404" pitchFamily="49" charset="0"/>
-                        <a:cs typeface="Courier New" panose="02070309020205020404" pitchFamily="49" charset="0"/>
-                      </a:endParaRPr>
-                    </a:p>
-                    <a:p>
-                      <a:pPr marL="171450" indent="-171450">
-                        <a:buFontTx/>
-                        <a:buChar char="-"/>
-                      </a:pPr>
-                      <a:r>
-                        <a:rPr lang="en-US" sz="1200" dirty="0" err="1">
-                          <a:latin typeface="Courier New" panose="02070309020205020404" pitchFamily="49" charset="0"/>
-                          <a:cs typeface="Courier New" panose="02070309020205020404" pitchFamily="49" charset="0"/>
-                        </a:rPr>
-                        <a:t>threeOfAKind</a:t>
-                      </a:r>
-                      <a:endParaRPr lang="en-US" sz="1200" dirty="0">
-                        <a:latin typeface="Courier New" panose="02070309020205020404" pitchFamily="49" charset="0"/>
-                        <a:cs typeface="Courier New" panose="02070309020205020404" pitchFamily="49" charset="0"/>
-                      </a:endParaRPr>
-                    </a:p>
-                    <a:p>
-                      <a:pPr marL="171450" indent="-171450">
-                        <a:buFontTx/>
-                        <a:buChar char="-"/>
-                      </a:pPr>
+                        <a:t>dealOneCard</a:t>
+                      </a:r>
                       <a:r>
                         <a:rPr lang="en-US" sz="1200" dirty="0">
                           <a:latin typeface="Courier New" panose="02070309020205020404" pitchFamily="49" charset="0"/>
                           <a:cs typeface="Courier New" panose="02070309020205020404" pitchFamily="49" charset="0"/>
                         </a:rPr>
-                        <a:t>straight</a:t>
-                      </a:r>
-                    </a:p>
-                    <a:p>
-                      <a:pPr marL="171450" indent="-171450">
-                        <a:buFontTx/>
-                        <a:buChar char="-"/>
-                      </a:pPr>
-                      <a:r>
-                        <a:rPr lang="en-US" sz="1200" dirty="0">
-                          <a:latin typeface="Courier New" panose="02070309020205020404" pitchFamily="49" charset="0"/>
-                          <a:cs typeface="Courier New" panose="02070309020205020404" pitchFamily="49" charset="0"/>
-                        </a:rPr>
-                        <a:t>flush</a:t>
-                      </a:r>
-                    </a:p>
-                    <a:p>
-                      <a:pPr marL="171450" indent="-171450">
-                        <a:buFontTx/>
-                        <a:buChar char="-"/>
-                      </a:pPr>
-                      <a:r>
-                        <a:rPr lang="en-US" sz="1200" dirty="0" err="1">
-                          <a:latin typeface="Courier New" panose="02070309020205020404" pitchFamily="49" charset="0"/>
-                          <a:cs typeface="Courier New" panose="02070309020205020404" pitchFamily="49" charset="0"/>
-                        </a:rPr>
-                        <a:t>fullHouse</a:t>
-                      </a:r>
-                      <a:endParaRPr lang="en-US" sz="1200" dirty="0">
-                        <a:latin typeface="Courier New" panose="02070309020205020404" pitchFamily="49" charset="0"/>
-                        <a:cs typeface="Courier New" panose="02070309020205020404" pitchFamily="49" charset="0"/>
-                      </a:endParaRPr>
-                    </a:p>
-                    <a:p>
-                      <a:pPr marL="171450" indent="-171450">
-                        <a:buFontTx/>
-                        <a:buChar char="-"/>
-                      </a:pPr>
-                      <a:r>
-                        <a:rPr lang="en-US" sz="1200" dirty="0" err="1">
-                          <a:latin typeface="Courier New" panose="02070309020205020404" pitchFamily="49" charset="0"/>
-                          <a:cs typeface="Courier New" panose="02070309020205020404" pitchFamily="49" charset="0"/>
-                        </a:rPr>
-                        <a:t>fourOfAKind</a:t>
-                      </a:r>
-                      <a:endParaRPr lang="en-US" sz="1200" dirty="0">
-                        <a:latin typeface="Courier New" panose="02070309020205020404" pitchFamily="49" charset="0"/>
-                        <a:cs typeface="Courier New" panose="02070309020205020404" pitchFamily="49" charset="0"/>
-                      </a:endParaRPr>
-                    </a:p>
-                    <a:p>
-                      <a:pPr marL="171450" indent="-171450">
-                        <a:buFontTx/>
-                        <a:buChar char="-"/>
-                      </a:pPr>
-                      <a:r>
-                        <a:rPr lang="en-US" sz="1200" dirty="0" err="1">
-                          <a:latin typeface="Courier New" panose="02070309020205020404" pitchFamily="49" charset="0"/>
-                          <a:cs typeface="Courier New" panose="02070309020205020404" pitchFamily="49" charset="0"/>
-                        </a:rPr>
-                        <a:t>straightFlush</a:t>
-                      </a:r>
-                      <a:endParaRPr lang="en-US" sz="1200" dirty="0">
-                        <a:latin typeface="Courier New" panose="02070309020205020404" pitchFamily="49" charset="0"/>
-                        <a:cs typeface="Courier New" panose="02070309020205020404" pitchFamily="49" charset="0"/>
-                      </a:endParaRPr>
-                    </a:p>
-                    <a:p>
-                      <a:pPr marL="171450" indent="-171450">
-                        <a:buFontTx/>
-                        <a:buChar char="-"/>
-                      </a:pPr>
-                      <a:r>
-                        <a:rPr lang="en-US" sz="1200" dirty="0" err="1">
-                          <a:latin typeface="Courier New" panose="02070309020205020404" pitchFamily="49" charset="0"/>
-                          <a:cs typeface="Courier New" panose="02070309020205020404" pitchFamily="49" charset="0"/>
-                        </a:rPr>
-                        <a:t>royalFlush</a:t>
-                      </a:r>
-                      <a:endParaRPr lang="en-US" sz="1200" dirty="0">
-                        <a:latin typeface="Courier New" panose="02070309020205020404" pitchFamily="49" charset="0"/>
-                        <a:cs typeface="Courier New" panose="02070309020205020404" pitchFamily="49" charset="0"/>
-                      </a:endParaRPr>
-                    </a:p>
-                  </a:txBody>
-                  <a:tcPr>
-                    <a:lnL w="12700" cap="flat" cmpd="sng" algn="ctr">
-                      <a:solidFill>
-                        <a:schemeClr val="tx1"/>
-                      </a:solidFill>
-                      <a:prstDash val="solid"/>
-                      <a:round/>
-                      <a:headEnd type="none" w="med" len="med"/>
-                      <a:tailEnd type="none" w="med" len="med"/>
-                    </a:lnL>
-                    <a:lnR w="12700" cap="flat" cmpd="sng" algn="ctr">
-                      <a:solidFill>
-                        <a:schemeClr val="tx1"/>
-                      </a:solidFill>
-                      <a:prstDash val="solid"/>
-                      <a:round/>
-                      <a:headEnd type="none" w="med" len="med"/>
-                      <a:tailEnd type="none" w="med" len="med"/>
-                    </a:lnR>
-                    <a:lnT w="12700" cap="flat" cmpd="sng" algn="ctr">
-                      <a:solidFill>
-                        <a:schemeClr val="tx1"/>
-                      </a:solidFill>
-                      <a:prstDash val="solid"/>
-                      <a:round/>
-                      <a:headEnd type="none" w="med" len="med"/>
-                      <a:tailEnd type="none" w="med" len="med"/>
-                    </a:lnT>
-                    <a:lnB w="12700" cap="flat" cmpd="sng" algn="ctr">
-                      <a:solidFill>
-                        <a:schemeClr val="tx1"/>
-                      </a:solidFill>
-                      <a:prstDash val="solid"/>
-                      <a:round/>
-                      <a:headEnd type="none" w="med" len="med"/>
-                      <a:tailEnd type="none" w="med" len="med"/>
-                    </a:lnB>
-                    <a:lnTlToBr w="12700" cmpd="sng">
-                      <a:noFill/>
-                      <a:prstDash val="solid"/>
-                    </a:lnTlToBr>
-                    <a:lnBlToTr w="12700" cmpd="sng">
-                      <a:noFill/>
-                      <a:prstDash val="solid"/>
-                    </a:lnBlToTr>
-                    <a:solidFill>
-                      <a:schemeClr val="bg1"/>
-                    </a:solidFill>
-                  </a:tcPr>
-                </a:tc>
-                <a:extLst>
-                  <a:ext uri="{0D108BD9-81ED-4DB2-BD59-A6C34878D82A}">
-                    <a16:rowId xmlns:a16="http://schemas.microsoft.com/office/drawing/2014/main" val="2144168801"/>
-                  </a:ext>
-                </a:extLst>
-              </a:tr>
-              <a:tr h="1401058">
-                <a:tc>
-                  <a:txBody>
-                    <a:bodyPr/>
-                    <a:lstStyle/>
-                    <a:p>
-                      <a:pPr marL="171450" indent="-171450">
-                        <a:buFontTx/>
-                        <a:buChar char="-"/>
-                      </a:pPr>
-                      <a:r>
-                        <a:rPr lang="en-US" sz="1200" dirty="0" err="1">
-                          <a:latin typeface="Courier New" panose="02070309020205020404" pitchFamily="49" charset="0"/>
-                          <a:cs typeface="Courier New" panose="02070309020205020404" pitchFamily="49" charset="0"/>
-                        </a:rPr>
-                        <a:t>hasNoPair</a:t>
-                      </a:r>
-                      <a:r>
-                        <a:rPr lang="en-US" sz="1200" dirty="0">
-                          <a:latin typeface="Courier New" panose="02070309020205020404" pitchFamily="49" charset="0"/>
-                          <a:cs typeface="Courier New" panose="02070309020205020404" pitchFamily="49" charset="0"/>
-                        </a:rPr>
-                        <a:t>()</a:t>
-                      </a:r>
-                    </a:p>
-                    <a:p>
-                      <a:pPr marL="171450" indent="-171450">
-                        <a:buFontTx/>
-                        <a:buChar char="-"/>
-                      </a:pPr>
-                      <a:r>
-                        <a:rPr lang="en-US" sz="1200" dirty="0" err="1">
-                          <a:latin typeface="Courier New" panose="02070309020205020404" pitchFamily="49" charset="0"/>
-                          <a:cs typeface="Courier New" panose="02070309020205020404" pitchFamily="49" charset="0"/>
-                        </a:rPr>
-                        <a:t>hasOnePair</a:t>
-                      </a:r>
-                      <a:r>
-                        <a:rPr lang="en-US" sz="1200" dirty="0">
-                          <a:latin typeface="Courier New" panose="02070309020205020404" pitchFamily="49" charset="0"/>
-                          <a:cs typeface="Courier New" panose="02070309020205020404" pitchFamily="49" charset="0"/>
-                        </a:rPr>
-                        <a:t>()</a:t>
-                      </a:r>
-                    </a:p>
-                    <a:p>
-                      <a:pPr marL="171450" indent="-171450">
-                        <a:buFontTx/>
-                        <a:buChar char="-"/>
-                      </a:pPr>
-                      <a:r>
-                        <a:rPr lang="en-US" sz="1200" dirty="0" err="1">
-                          <a:latin typeface="Courier New" panose="02070309020205020404" pitchFamily="49" charset="0"/>
-                          <a:cs typeface="Courier New" panose="02070309020205020404" pitchFamily="49" charset="0"/>
-                        </a:rPr>
-                        <a:t>hasTwoPairs</a:t>
-                      </a:r>
-                      <a:r>
-                        <a:rPr lang="en-US" sz="1200" dirty="0">
-                          <a:latin typeface="Courier New" panose="02070309020205020404" pitchFamily="49" charset="0"/>
-                          <a:cs typeface="Courier New" panose="02070309020205020404" pitchFamily="49" charset="0"/>
-                        </a:rPr>
-                        <a:t>()</a:t>
-                      </a:r>
-                    </a:p>
-                    <a:p>
-                      <a:pPr marL="171450" indent="-171450">
-                        <a:buFontTx/>
-                        <a:buChar char="-"/>
-                      </a:pPr>
-                      <a:r>
-                        <a:rPr lang="en-US" sz="1200" dirty="0" err="1">
-                          <a:latin typeface="Courier New" panose="02070309020205020404" pitchFamily="49" charset="0"/>
-                          <a:cs typeface="Courier New" panose="02070309020205020404" pitchFamily="49" charset="0"/>
-                        </a:rPr>
-                        <a:t>hasThreeOfAKind</a:t>
-                      </a:r>
-                      <a:r>
-                        <a:rPr lang="en-US" sz="1200" dirty="0">
-                          <a:latin typeface="Courier New" panose="02070309020205020404" pitchFamily="49" charset="0"/>
-                          <a:cs typeface="Courier New" panose="02070309020205020404" pitchFamily="49" charset="0"/>
-                        </a:rPr>
-                        <a:t>()</a:t>
-                      </a:r>
-                    </a:p>
-                    <a:p>
-                      <a:pPr marL="171450" indent="-171450">
-                        <a:buFontTx/>
-                        <a:buChar char="-"/>
-                      </a:pPr>
-                      <a:r>
-                        <a:rPr lang="en-US" sz="1200" dirty="0" err="1">
-                          <a:latin typeface="Courier New" panose="02070309020205020404" pitchFamily="49" charset="0"/>
-                          <a:cs typeface="Courier New" panose="02070309020205020404" pitchFamily="49" charset="0"/>
-                        </a:rPr>
-                        <a:t>hasStraight</a:t>
-                      </a:r>
-                      <a:r>
-                        <a:rPr lang="en-US" sz="1200" dirty="0">
-                          <a:latin typeface="Courier New" panose="02070309020205020404" pitchFamily="49" charset="0"/>
-                          <a:cs typeface="Courier New" panose="02070309020205020404" pitchFamily="49" charset="0"/>
-                        </a:rPr>
-                        <a:t>()</a:t>
-                      </a:r>
-                    </a:p>
-                    <a:p>
-                      <a:pPr marL="171450" indent="-171450">
-                        <a:buFontTx/>
-                        <a:buChar char="-"/>
-                      </a:pPr>
-                      <a:r>
-                        <a:rPr lang="en-US" sz="1200" dirty="0" err="1">
-                          <a:latin typeface="Courier New" panose="02070309020205020404" pitchFamily="49" charset="0"/>
-                          <a:cs typeface="Courier New" panose="02070309020205020404" pitchFamily="49" charset="0"/>
-                        </a:rPr>
-                        <a:t>hasFlush</a:t>
-                      </a:r>
-                      <a:r>
-                        <a:rPr lang="en-US" sz="1200" dirty="0">
-                          <a:latin typeface="Courier New" panose="02070309020205020404" pitchFamily="49" charset="0"/>
-                          <a:cs typeface="Courier New" panose="02070309020205020404" pitchFamily="49" charset="0"/>
-                        </a:rPr>
-                        <a:t>()</a:t>
-                      </a:r>
-                    </a:p>
-                    <a:p>
-                      <a:pPr marL="171450" indent="-171450">
-                        <a:buFontTx/>
-                        <a:buChar char="-"/>
-                      </a:pPr>
-                      <a:r>
-                        <a:rPr lang="en-US" sz="1200" dirty="0" err="1">
-                          <a:latin typeface="Courier New" panose="02070309020205020404" pitchFamily="49" charset="0"/>
-                          <a:cs typeface="Courier New" panose="02070309020205020404" pitchFamily="49" charset="0"/>
-                        </a:rPr>
-                        <a:t>hasFullHouse</a:t>
-                      </a:r>
-                      <a:r>
-                        <a:rPr lang="en-US" sz="1200" dirty="0">
-                          <a:latin typeface="Courier New" panose="02070309020205020404" pitchFamily="49" charset="0"/>
-                          <a:cs typeface="Courier New" panose="02070309020205020404" pitchFamily="49" charset="0"/>
-                        </a:rPr>
-                        <a:t>()</a:t>
-                      </a:r>
-                    </a:p>
-                    <a:p>
-                      <a:pPr marL="171450" indent="-171450">
-                        <a:buFontTx/>
-                        <a:buChar char="-"/>
-                      </a:pPr>
-                      <a:r>
-                        <a:rPr lang="en-US" sz="1200" dirty="0" err="1">
-                          <a:latin typeface="Courier New" panose="02070309020205020404" pitchFamily="49" charset="0"/>
-                          <a:cs typeface="Courier New" panose="02070309020205020404" pitchFamily="49" charset="0"/>
-                        </a:rPr>
-                        <a:t>hasFourOfAKind</a:t>
-                      </a:r>
-                      <a:r>
-                        <a:rPr lang="en-US" sz="1200" dirty="0">
-                          <a:latin typeface="Courier New" panose="02070309020205020404" pitchFamily="49" charset="0"/>
-                          <a:cs typeface="Courier New" panose="02070309020205020404" pitchFamily="49" charset="0"/>
-                        </a:rPr>
-                        <a:t>()</a:t>
-                      </a:r>
-                    </a:p>
-                    <a:p>
-                      <a:pPr marL="171450" indent="-171450">
-                        <a:buFontTx/>
-                        <a:buChar char="-"/>
-                      </a:pPr>
-                      <a:r>
-                        <a:rPr lang="en-US" sz="1200" dirty="0" err="1">
-                          <a:latin typeface="Courier New" panose="02070309020205020404" pitchFamily="49" charset="0"/>
-                          <a:cs typeface="Courier New" panose="02070309020205020404" pitchFamily="49" charset="0"/>
-                        </a:rPr>
-                        <a:t>hasStraightFlush</a:t>
-                      </a:r>
-                      <a:r>
-                        <a:rPr lang="en-US" sz="1200" dirty="0">
-                          <a:latin typeface="Courier New" panose="02070309020205020404" pitchFamily="49" charset="0"/>
-                          <a:cs typeface="Courier New" panose="02070309020205020404" pitchFamily="49" charset="0"/>
-                        </a:rPr>
-                        <a:t>()</a:t>
-                      </a:r>
-                    </a:p>
-                    <a:p>
-                      <a:pPr marL="171450" indent="-171450">
-                        <a:buFontTx/>
-                        <a:buChar char="-"/>
-                      </a:pPr>
-                      <a:r>
-                        <a:rPr lang="en-US" sz="1200" dirty="0" err="1">
-                          <a:latin typeface="Courier New" panose="02070309020205020404" pitchFamily="49" charset="0"/>
-                          <a:cs typeface="Courier New" panose="02070309020205020404" pitchFamily="49" charset="0"/>
-                        </a:rPr>
-                        <a:t>hasRoyalFlush</a:t>
-                      </a:r>
-                      <a:r>
-                        <a:rPr lang="en-US" sz="1200" dirty="0">
-                          <a:latin typeface="Courier New" panose="02070309020205020404" pitchFamily="49" charset="0"/>
-                          <a:cs typeface="Courier New" panose="02070309020205020404" pitchFamily="49" charset="0"/>
-                        </a:rPr>
-                        <a:t>()</a:t>
+                        <a:t>():Card</a:t>
                       </a:r>
                     </a:p>
                   </a:txBody>
@@ -4652,14 +4080,14 @@
           <p:nvPr>
             <p:extLst>
               <p:ext uri="{D42A27DB-BD31-4B8C-83A1-F6EECF244321}">
-                <p14:modId xmlns:p14="http://schemas.microsoft.com/office/powerpoint/2010/main" val="910989722"/>
+                <p14:modId xmlns:p14="http://schemas.microsoft.com/office/powerpoint/2010/main" val="1867230863"/>
               </p:ext>
             </p:extLst>
           </p:nvPr>
         </p:nvGraphicFramePr>
         <p:xfrm>
-          <a:off x="3378130" y="2183045"/>
-          <a:ext cx="2111566" cy="1061956"/>
+          <a:off x="2865422" y="1635822"/>
+          <a:ext cx="2709844" cy="2042160"/>
         </p:xfrm>
         <a:graphic>
           <a:graphicData uri="http://schemas.openxmlformats.org/drawingml/2006/table">
@@ -4668,7 +4096,7 @@
                 <a:tableStyleId>{5C22544A-7EE6-4342-B048-85BDC9FD1C3A}</a:tableStyleId>
               </a:tblPr>
               <a:tblGrid>
-                <a:gridCol w="2111566">
+                <a:gridCol w="2709844">
                   <a:extLst>
                     <a:ext uri="{9D8B030D-6E8A-4147-A177-3AD203B41FA5}">
                       <a16:colId xmlns:a16="http://schemas.microsoft.com/office/drawing/2014/main" val="997862604"/>
@@ -4676,7 +4104,7 @@
                   </a:extLst>
                 </a:gridCol>
               </a:tblGrid>
-              <a:tr h="284487">
+              <a:tr h="365283">
                 <a:tc>
                   <a:txBody>
                     <a:bodyPr/>
@@ -4758,7 +4186,7 @@
                   </a:ext>
                 </a:extLst>
               </a:tr>
-              <a:tr h="302810">
+              <a:tr h="376268">
                 <a:tc>
                   <a:txBody>
                     <a:bodyPr/>
@@ -4768,6 +4196,142 @@
                         <a:buFontTx/>
                         <a:buChar char="-"/>
                       </a:pPr>
+                      <a:r>
+                        <a:rPr lang="en-US" sz="1200" dirty="0" err="1">
+                          <a:latin typeface="Courier New" panose="02070309020205020404" pitchFamily="49" charset="0"/>
+                          <a:cs typeface="Courier New" panose="02070309020205020404" pitchFamily="49" charset="0"/>
+                        </a:rPr>
+                        <a:t>possibleHands</a:t>
+                      </a:r>
+                      <a:r>
+                        <a:rPr lang="en-US" sz="1200" dirty="0">
+                          <a:latin typeface="Courier New" panose="02070309020205020404" pitchFamily="49" charset="0"/>
+                          <a:cs typeface="Courier New" panose="02070309020205020404" pitchFamily="49" charset="0"/>
+                        </a:rPr>
+                        <a:t> : </a:t>
+                      </a:r>
+                      <a:r>
+                        <a:rPr lang="en-US" sz="1200" dirty="0" err="1">
+                          <a:latin typeface="Courier New" panose="02070309020205020404" pitchFamily="49" charset="0"/>
+                          <a:cs typeface="Courier New" panose="02070309020205020404" pitchFamily="49" charset="0"/>
+                        </a:rPr>
+                        <a:t>enum</a:t>
+                      </a:r>
+                      <a:endParaRPr lang="en-US" sz="1200" dirty="0">
+                        <a:latin typeface="Courier New" panose="02070309020205020404" pitchFamily="49" charset="0"/>
+                        <a:cs typeface="Courier New" panose="02070309020205020404" pitchFamily="49" charset="0"/>
+                      </a:endParaRPr>
+                    </a:p>
+                    <a:p>
+                      <a:pPr marL="0" indent="0">
+                        <a:buFontTx/>
+                        <a:buNone/>
+                      </a:pPr>
+                      <a:r>
+                        <a:rPr lang="en-US" sz="1200" dirty="0" err="1">
+                          <a:latin typeface="Courier New" panose="02070309020205020404" pitchFamily="49" charset="0"/>
+                          <a:cs typeface="Courier New" panose="02070309020205020404" pitchFamily="49" charset="0"/>
+                        </a:rPr>
+                        <a:t>noPair</a:t>
+                      </a:r>
+                      <a:r>
+                        <a:rPr lang="en-US" sz="1200" dirty="0">
+                          <a:latin typeface="Courier New" panose="02070309020205020404" pitchFamily="49" charset="0"/>
+                          <a:cs typeface="Courier New" panose="02070309020205020404" pitchFamily="49" charset="0"/>
+                        </a:rPr>
+                        <a:t>, </a:t>
+                      </a:r>
+                      <a:r>
+                        <a:rPr lang="en-US" sz="1200" dirty="0" err="1">
+                          <a:latin typeface="Courier New" panose="02070309020205020404" pitchFamily="49" charset="0"/>
+                          <a:cs typeface="Courier New" panose="02070309020205020404" pitchFamily="49" charset="0"/>
+                        </a:rPr>
+                        <a:t>onePair</a:t>
+                      </a:r>
+                      <a:r>
+                        <a:rPr lang="en-US" sz="1200" dirty="0">
+                          <a:latin typeface="Courier New" panose="02070309020205020404" pitchFamily="49" charset="0"/>
+                          <a:cs typeface="Courier New" panose="02070309020205020404" pitchFamily="49" charset="0"/>
+                        </a:rPr>
+                        <a:t>, </a:t>
+                      </a:r>
+                      <a:r>
+                        <a:rPr lang="en-US" sz="1200" dirty="0" err="1">
+                          <a:latin typeface="Courier New" panose="02070309020205020404" pitchFamily="49" charset="0"/>
+                          <a:cs typeface="Courier New" panose="02070309020205020404" pitchFamily="49" charset="0"/>
+                        </a:rPr>
+                        <a:t>twoPairs</a:t>
+                      </a:r>
+                      <a:r>
+                        <a:rPr lang="en-US" sz="1200" dirty="0">
+                          <a:latin typeface="Courier New" panose="02070309020205020404" pitchFamily="49" charset="0"/>
+                          <a:cs typeface="Courier New" panose="02070309020205020404" pitchFamily="49" charset="0"/>
+                        </a:rPr>
+                        <a:t>, </a:t>
+                      </a:r>
+                      <a:r>
+                        <a:rPr lang="en-US" sz="1200" dirty="0" err="1">
+                          <a:latin typeface="Courier New" panose="02070309020205020404" pitchFamily="49" charset="0"/>
+                          <a:cs typeface="Courier New" panose="02070309020205020404" pitchFamily="49" charset="0"/>
+                        </a:rPr>
+                        <a:t>threeOfAKind</a:t>
+                      </a:r>
+                      <a:r>
+                        <a:rPr lang="en-US" sz="1200" dirty="0">
+                          <a:latin typeface="Courier New" panose="02070309020205020404" pitchFamily="49" charset="0"/>
+                          <a:cs typeface="Courier New" panose="02070309020205020404" pitchFamily="49" charset="0"/>
+                        </a:rPr>
+                        <a:t>, straight, flush, </a:t>
+                      </a:r>
+                      <a:r>
+                        <a:rPr lang="en-US" sz="1200" dirty="0" err="1">
+                          <a:latin typeface="Courier New" panose="02070309020205020404" pitchFamily="49" charset="0"/>
+                          <a:cs typeface="Courier New" panose="02070309020205020404" pitchFamily="49" charset="0"/>
+                        </a:rPr>
+                        <a:t>fullHouse</a:t>
+                      </a:r>
+                      <a:r>
+                        <a:rPr lang="en-US" sz="1200" dirty="0">
+                          <a:latin typeface="Courier New" panose="02070309020205020404" pitchFamily="49" charset="0"/>
+                          <a:cs typeface="Courier New" panose="02070309020205020404" pitchFamily="49" charset="0"/>
+                        </a:rPr>
+                        <a:t>, </a:t>
+                      </a:r>
+                      <a:r>
+                        <a:rPr lang="en-US" sz="1200" dirty="0" err="1">
+                          <a:latin typeface="Courier New" panose="02070309020205020404" pitchFamily="49" charset="0"/>
+                          <a:cs typeface="Courier New" panose="02070309020205020404" pitchFamily="49" charset="0"/>
+                        </a:rPr>
+                        <a:t>fourOfAKind</a:t>
+                      </a:r>
+                      <a:r>
+                        <a:rPr lang="en-US" sz="1200" dirty="0">
+                          <a:latin typeface="Courier New" panose="02070309020205020404" pitchFamily="49" charset="0"/>
+                          <a:cs typeface="Courier New" panose="02070309020205020404" pitchFamily="49" charset="0"/>
+                        </a:rPr>
+                        <a:t>, </a:t>
+                      </a:r>
+                      <a:r>
+                        <a:rPr lang="en-US" sz="1200" dirty="0" err="1">
+                          <a:latin typeface="Courier New" panose="02070309020205020404" pitchFamily="49" charset="0"/>
+                          <a:cs typeface="Courier New" panose="02070309020205020404" pitchFamily="49" charset="0"/>
+                        </a:rPr>
+                        <a:t>striaghtFlush</a:t>
+                      </a:r>
+                      <a:r>
+                        <a:rPr lang="en-US" sz="1200" dirty="0">
+                          <a:latin typeface="Courier New" panose="02070309020205020404" pitchFamily="49" charset="0"/>
+                          <a:cs typeface="Courier New" panose="02070309020205020404" pitchFamily="49" charset="0"/>
+                        </a:rPr>
+                        <a:t>, </a:t>
+                      </a:r>
+                      <a:r>
+                        <a:rPr lang="en-US" sz="1200" dirty="0" err="1">
+                          <a:latin typeface="Courier New" panose="02070309020205020404" pitchFamily="49" charset="0"/>
+                          <a:cs typeface="Courier New" panose="02070309020205020404" pitchFamily="49" charset="0"/>
+                        </a:rPr>
+                        <a:t>royalFlush</a:t>
+                      </a:r>
                       <a:endParaRPr lang="en-US" sz="1200" dirty="0">
                         <a:latin typeface="Courier New" panose="02070309020205020404" pitchFamily="49" charset="0"/>
                         <a:cs typeface="Courier New" panose="02070309020205020404" pitchFamily="49" charset="0"/>
@@ -4830,17 +4394,24 @@
                   </a:ext>
                 </a:extLst>
               </a:tr>
-              <a:tr h="362906">
+              <a:tr h="450942">
                 <a:tc>
                   <a:txBody>
                     <a:bodyPr/>
                     <a:lstStyle/>
                     <a:p>
-                      <a:pPr marL="171450" indent="-171450">
+                      <a:pPr marL="0" indent="0">
                         <a:buFontTx/>
-                        <a:buChar char="-"/>
+                        <a:buNone/>
                       </a:pPr>
                       <a:r>
+                        <a:rPr lang="en-US" sz="1200" dirty="0">
+                          <a:latin typeface="Courier New" panose="02070309020205020404" pitchFamily="49" charset="0"/>
+                          <a:cs typeface="Courier New" panose="02070309020205020404" pitchFamily="49" charset="0"/>
+                        </a:rPr>
+                        <a:t>+ </a:t>
+                      </a:r>
+                      <a:r>
                         <a:rPr lang="en-US" sz="1200" dirty="0" err="1">
                           <a:latin typeface="Courier New" panose="02070309020205020404" pitchFamily="49" charset="0"/>
                           <a:cs typeface="Courier New" panose="02070309020205020404" pitchFamily="49" charset="0"/>
@@ -4853,6 +4424,33 @@
                           <a:cs typeface="Courier New" panose="02070309020205020404" pitchFamily="49" charset="0"/>
                         </a:rPr>
                         <a:t>():void</a:t>
+                      </a:r>
+                    </a:p>
+                    <a:p>
+                      <a:pPr marL="0" indent="0">
+                        <a:buFontTx/>
+                        <a:buNone/>
+                      </a:pPr>
+                      <a:r>
+                        <a:rPr lang="en-US" sz="1200" dirty="0">
+                          <a:latin typeface="Courier New" panose="02070309020205020404" pitchFamily="49" charset="0"/>
+                          <a:cs typeface="Courier New" panose="02070309020205020404" pitchFamily="49" charset="0"/>
+                        </a:rPr>
+                        <a:t>+ </a:t>
+                      </a:r>
+                      <a:r>
+                        <a:rPr lang="en-US" sz="1200" dirty="0" err="1">
+                          <a:latin typeface="Courier New" panose="02070309020205020404" pitchFamily="49" charset="0"/>
+                          <a:cs typeface="Courier New" panose="02070309020205020404" pitchFamily="49" charset="0"/>
+                        </a:rPr>
+                        <a:t>bestHand</a:t>
+                      </a:r>
+                      <a:r>
+                        <a:rPr lang="en-US" sz="1200" dirty="0">
+                          <a:latin typeface="Courier New" panose="02070309020205020404" pitchFamily="49" charset="0"/>
+                          <a:cs typeface="Courier New" panose="02070309020205020404" pitchFamily="49" charset="0"/>
+                        </a:rPr>
+                        <a:t>() :Player</a:t>
                       </a:r>
                     </a:p>
                   </a:txBody>
@@ -4931,14 +4529,14 @@
           <p:nvPr>
             <p:extLst>
               <p:ext uri="{D42A27DB-BD31-4B8C-83A1-F6EECF244321}">
-                <p14:modId xmlns:p14="http://schemas.microsoft.com/office/powerpoint/2010/main" val="753201147"/>
+                <p14:modId xmlns:p14="http://schemas.microsoft.com/office/powerpoint/2010/main" val="3068327264"/>
               </p:ext>
             </p:extLst>
           </p:nvPr>
         </p:nvGraphicFramePr>
         <p:xfrm>
-          <a:off x="258066" y="140885"/>
-          <a:ext cx="2111566" cy="2042160"/>
+          <a:off x="375671" y="291716"/>
+          <a:ext cx="1714386" cy="2042160"/>
         </p:xfrm>
         <a:graphic>
           <a:graphicData uri="http://schemas.openxmlformats.org/drawingml/2006/table">
@@ -4947,7 +4545,7 @@
                 <a:tableStyleId>{5C22544A-7EE6-4342-B048-85BDC9FD1C3A}</a:tableStyleId>
               </a:tblPr>
               <a:tblGrid>
-                <a:gridCol w="2111566">
+                <a:gridCol w="1714386">
                   <a:extLst>
                     <a:ext uri="{9D8B030D-6E8A-4147-A177-3AD203B41FA5}">
                       <a16:colId xmlns:a16="http://schemas.microsoft.com/office/drawing/2014/main" val="997862604"/>
@@ -5119,65 +4717,65 @@
                   </a:ext>
                 </a:extLst>
               </a:tr>
-              <a:tr h="1223241">
+              <a:tr h="1335407">
                 <a:tc>
                   <a:txBody>
                     <a:bodyPr/>
                     <a:lstStyle/>
                     <a:p>
-                      <a:pPr marL="171450" indent="-171450">
+                      <a:pPr marL="0" indent="0">
                         <a:buFontTx/>
-                        <a:buChar char="-"/>
+                        <a:buNone/>
                       </a:pPr>
                       <a:r>
                         <a:rPr lang="en-US" sz="1200" dirty="0">
                           <a:latin typeface="Courier New" panose="02070309020205020404" pitchFamily="49" charset="0"/>
                           <a:cs typeface="Courier New" panose="02070309020205020404" pitchFamily="49" charset="0"/>
                         </a:rPr>
-                        <a:t>check()</a:t>
+                        <a:t>+ check()</a:t>
                       </a:r>
                     </a:p>
                     <a:p>
-                      <a:pPr marL="171450" indent="-171450">
+                      <a:pPr marL="0" indent="0">
                         <a:buFontTx/>
-                        <a:buChar char="-"/>
+                        <a:buNone/>
                       </a:pPr>
                       <a:r>
                         <a:rPr lang="en-US" sz="1200" dirty="0">
                           <a:latin typeface="Courier New" panose="02070309020205020404" pitchFamily="49" charset="0"/>
                           <a:cs typeface="Courier New" panose="02070309020205020404" pitchFamily="49" charset="0"/>
                         </a:rPr>
-                        <a:t>call()</a:t>
+                        <a:t>+ call()</a:t>
                       </a:r>
                     </a:p>
                     <a:p>
-                      <a:pPr marL="171450" indent="-171450">
+                      <a:pPr marL="0" indent="0">
                         <a:buFontTx/>
-                        <a:buChar char="-"/>
+                        <a:buNone/>
                       </a:pPr>
                       <a:r>
                         <a:rPr lang="en-US" sz="1200" dirty="0">
                           <a:latin typeface="Courier New" panose="02070309020205020404" pitchFamily="49" charset="0"/>
                           <a:cs typeface="Courier New" panose="02070309020205020404" pitchFamily="49" charset="0"/>
                         </a:rPr>
-                        <a:t>raise()</a:t>
+                        <a:t>+ raise()</a:t>
                       </a:r>
                     </a:p>
                     <a:p>
-                      <a:pPr marL="171450" indent="-171450">
+                      <a:pPr marL="0" indent="0">
                         <a:buFontTx/>
-                        <a:buChar char="-"/>
+                        <a:buNone/>
                       </a:pPr>
                       <a:r>
                         <a:rPr lang="en-US" sz="1200" dirty="0">
                           <a:latin typeface="Courier New" panose="02070309020205020404" pitchFamily="49" charset="0"/>
                           <a:cs typeface="Courier New" panose="02070309020205020404" pitchFamily="49" charset="0"/>
                         </a:rPr>
-                        <a:t>jam()</a:t>
+                        <a:t>+ jam()</a:t>
                       </a:r>
                     </a:p>
                     <a:p>
-                      <a:pPr marL="171450" marR="0" lvl="0" indent="-171450" algn="l" defTabSz="914400" rtl="0" eaLnBrk="1" fontAlgn="auto" latinLnBrk="0" hangingPunct="1">
+                      <a:pPr marL="0" marR="0" lvl="0" indent="0" algn="l" defTabSz="914400" rtl="0" eaLnBrk="1" fontAlgn="auto" latinLnBrk="0" hangingPunct="1">
                         <a:lnSpc>
                           <a:spcPct val="100000"/>
                         </a:lnSpc>
@@ -5190,7 +4788,7 @@
                         <a:buClrTx/>
                         <a:buSzTx/>
                         <a:buFontTx/>
-                        <a:buChar char="-"/>
+                        <a:buNone/>
                         <a:tabLst/>
                         <a:defRPr/>
                       </a:pPr>
@@ -5199,11 +4797,11 @@
                           <a:latin typeface="Courier New" panose="02070309020205020404" pitchFamily="49" charset="0"/>
                           <a:cs typeface="Courier New" panose="02070309020205020404" pitchFamily="49" charset="0"/>
                         </a:rPr>
-                        <a:t>fold() </a:t>
+                        <a:t>+ fold() </a:t>
                       </a:r>
                     </a:p>
                     <a:p>
-                      <a:pPr marL="171450" marR="0" lvl="0" indent="-171450" algn="l" defTabSz="914400" rtl="0" eaLnBrk="1" fontAlgn="auto" latinLnBrk="0" hangingPunct="1">
+                      <a:pPr marL="0" marR="0" lvl="0" indent="0" algn="l" defTabSz="914400" rtl="0" eaLnBrk="1" fontAlgn="auto" latinLnBrk="0" hangingPunct="1">
                         <a:lnSpc>
                           <a:spcPct val="100000"/>
                         </a:lnSpc>
@@ -5216,11 +4814,18 @@
                         <a:buClrTx/>
                         <a:buSzTx/>
                         <a:buFontTx/>
-                        <a:buChar char="-"/>
+                        <a:buNone/>
                         <a:tabLst/>
                         <a:defRPr/>
                       </a:pPr>
                       <a:r>
+                        <a:rPr lang="en-US" sz="1200" dirty="0">
+                          <a:latin typeface="Courier New" panose="02070309020205020404" pitchFamily="49" charset="0"/>
+                          <a:cs typeface="Courier New" panose="02070309020205020404" pitchFamily="49" charset="0"/>
+                        </a:rPr>
+                        <a:t>+ </a:t>
+                      </a:r>
+                      <a:r>
                         <a:rPr lang="en-US" sz="1200" dirty="0" err="1">
                           <a:latin typeface="Courier New" panose="02070309020205020404" pitchFamily="49" charset="0"/>
                           <a:cs typeface="Courier New" panose="02070309020205020404" pitchFamily="49" charset="0"/>
@@ -5236,7 +4841,7 @@
                       </a:r>
                     </a:p>
                     <a:p>
-                      <a:pPr marL="171450" marR="0" lvl="0" indent="-171450" algn="l" defTabSz="914400" rtl="0" eaLnBrk="1" fontAlgn="auto" latinLnBrk="0" hangingPunct="1">
+                      <a:pPr marL="0" marR="0" lvl="0" indent="0" algn="l" defTabSz="914400" rtl="0" eaLnBrk="1" fontAlgn="auto" latinLnBrk="0" hangingPunct="1">
                         <a:lnSpc>
                           <a:spcPct val="100000"/>
                         </a:lnSpc>
@@ -5249,7 +4854,7 @@
                         <a:buClrTx/>
                         <a:buSzTx/>
                         <a:buFontTx/>
-                        <a:buChar char="-"/>
+                        <a:buNone/>
                         <a:tabLst/>
                         <a:defRPr/>
                       </a:pPr>
@@ -5258,7 +4863,7 @@
                           <a:latin typeface="Courier New" panose="02070309020205020404" pitchFamily="49" charset="0"/>
                           <a:cs typeface="Courier New" panose="02070309020205020404" pitchFamily="49" charset="0"/>
                         </a:rPr>
-                        <a:t>reveal()</a:t>
+                        <a:t>+ reveal()</a:t>
                       </a:r>
                     </a:p>
                   </a:txBody>
@@ -5337,7 +4942,7 @@
           <p:nvPr>
             <p:extLst>
               <p:ext uri="{D42A27DB-BD31-4B8C-83A1-F6EECF244321}">
-                <p14:modId xmlns:p14="http://schemas.microsoft.com/office/powerpoint/2010/main" val="2952134251"/>
+                <p14:modId xmlns:p14="http://schemas.microsoft.com/office/powerpoint/2010/main" val="203005917"/>
               </p:ext>
             </p:extLst>
           </p:nvPr>
@@ -5567,23 +5172,30 @@
                     <a:bodyPr/>
                     <a:lstStyle/>
                     <a:p>
-                      <a:pPr marL="171450" indent="-171450">
+                      <a:pPr marL="0" indent="0">
                         <a:buFontTx/>
-                        <a:buChar char="-"/>
+                        <a:buNone/>
                       </a:pPr>
                       <a:r>
                         <a:rPr lang="en-US" sz="1200" dirty="0">
                           <a:latin typeface="Courier New" panose="02070309020205020404" pitchFamily="49" charset="0"/>
                           <a:cs typeface="Courier New" panose="02070309020205020404" pitchFamily="49" charset="0"/>
                         </a:rPr>
-                        <a:t>display():void</a:t>
+                        <a:t>+ display():void</a:t>
                       </a:r>
                     </a:p>
                     <a:p>
-                      <a:pPr marL="171450" indent="-171450">
+                      <a:pPr marL="0" indent="0">
                         <a:buFontTx/>
-                        <a:buChar char="-"/>
+                        <a:buNone/>
                       </a:pPr>
+                      <a:r>
+                        <a:rPr lang="en-US" sz="1200" dirty="0">
+                          <a:latin typeface="Courier New" panose="02070309020205020404" pitchFamily="49" charset="0"/>
+                          <a:cs typeface="Courier New" panose="02070309020205020404" pitchFamily="49" charset="0"/>
+                        </a:rPr>
+                        <a:t>+ </a:t>
+                      </a:r>
                       <a:r>
                         <a:rPr lang="en-US" sz="1200" dirty="0" err="1">
                           <a:latin typeface="Courier New" panose="02070309020205020404" pitchFamily="49" charset="0"/>
@@ -5676,8 +5288,8 @@
         </p:nvCxnSpPr>
         <p:spPr>
           <a:xfrm>
-            <a:off x="7410450" y="1581150"/>
-            <a:ext cx="7189" cy="583002"/>
+            <a:off x="7485921" y="1740432"/>
+            <a:ext cx="6259" cy="576870"/>
           </a:xfrm>
           <a:prstGeom prst="straightConnector1">
             <a:avLst/>
@@ -5715,7 +5327,7 @@
         </p:nvSpPr>
         <p:spPr>
           <a:xfrm>
-            <a:off x="7435608" y="1685925"/>
+            <a:off x="7653808" y="1800157"/>
             <a:ext cx="813871" cy="307777"/>
           </a:xfrm>
           <a:prstGeom prst="rect">
@@ -5736,7 +5348,7 @@
                   <a:schemeClr val="accent1"/>
                 </a:solidFill>
               </a:rPr>
-              <a:t>Contains</a:t>
+              <a:t>Extends</a:t>
             </a:r>
           </a:p>
         </p:txBody>
@@ -5838,8 +5450,8 @@
         </p:nvCxnSpPr>
         <p:spPr>
           <a:xfrm flipV="1">
-            <a:off x="4395110" y="3360145"/>
-            <a:ext cx="0" cy="598289"/>
+            <a:off x="2646283" y="3784464"/>
+            <a:ext cx="529605" cy="1078306"/>
           </a:xfrm>
           <a:prstGeom prst="straightConnector1">
             <a:avLst/>
@@ -5876,8 +5488,8 @@
           <p:nvPr/>
         </p:nvSpPr>
         <p:spPr>
-          <a:xfrm>
-            <a:off x="4401495" y="3567370"/>
+          <a:xfrm rot="17832342">
+            <a:off x="2787239" y="4163869"/>
             <a:ext cx="813871" cy="307777"/>
           </a:xfrm>
           <a:prstGeom prst="rect">
@@ -6000,8 +5612,8 @@
         </p:nvCxnSpPr>
         <p:spPr>
           <a:xfrm flipH="1" flipV="1">
-            <a:off x="2456806" y="1774953"/>
-            <a:ext cx="877735" cy="2151042"/>
+            <a:off x="1385754" y="2424945"/>
+            <a:ext cx="18676" cy="913961"/>
           </a:xfrm>
           <a:prstGeom prst="straightConnector1">
             <a:avLst/>
@@ -6025,87 +5637,6 @@
           </a:fontRef>
         </p:style>
       </p:cxnSp>
-      <p:cxnSp>
-        <p:nvCxnSpPr>
-          <p:cNvPr id="43" name="Straight Arrow Connector 42">
-            <a:extLst>
-              <a:ext uri="{FF2B5EF4-FFF2-40B4-BE49-F238E27FC236}">
-                <a16:creationId xmlns:a16="http://schemas.microsoft.com/office/drawing/2014/main" id="{1112ABE2-393E-444F-AB33-764B03945138}"/>
-              </a:ext>
-            </a:extLst>
-          </p:cNvPr>
-          <p:cNvCxnSpPr>
-            <a:cxnSpLocks/>
-          </p:cNvCxnSpPr>
-          <p:nvPr/>
-        </p:nvCxnSpPr>
-        <p:spPr>
-          <a:xfrm flipV="1">
-            <a:off x="2530325" y="4223438"/>
-            <a:ext cx="709299" cy="1"/>
-          </a:xfrm>
-          <a:prstGeom prst="straightConnector1">
-            <a:avLst/>
-          </a:prstGeom>
-          <a:ln>
-            <a:tailEnd type="triangle"/>
-          </a:ln>
-        </p:spPr>
-        <p:style>
-          <a:lnRef idx="1">
-            <a:schemeClr val="accent1"/>
-          </a:lnRef>
-          <a:fillRef idx="0">
-            <a:schemeClr val="accent1"/>
-          </a:fillRef>
-          <a:effectRef idx="0">
-            <a:schemeClr val="accent1"/>
-          </a:effectRef>
-          <a:fontRef idx="minor">
-            <a:schemeClr val="tx1"/>
-          </a:fontRef>
-        </p:style>
-      </p:cxnSp>
-      <p:sp>
-        <p:nvSpPr>
-          <p:cNvPr id="45" name="TextBox 44">
-            <a:extLst>
-              <a:ext uri="{FF2B5EF4-FFF2-40B4-BE49-F238E27FC236}">
-                <a16:creationId xmlns:a16="http://schemas.microsoft.com/office/drawing/2014/main" id="{0DEC5A25-06B9-4514-879F-03BB48265D7E}"/>
-              </a:ext>
-            </a:extLst>
-          </p:cNvPr>
-          <p:cNvSpPr txBox="1"/>
-          <p:nvPr/>
-        </p:nvSpPr>
-        <p:spPr>
-          <a:xfrm>
-            <a:off x="2488737" y="4272342"/>
-            <a:ext cx="813871" cy="307777"/>
-          </a:xfrm>
-          <a:prstGeom prst="rect">
-            <a:avLst/>
-          </a:prstGeom>
-          <a:noFill/>
-        </p:spPr>
-        <p:txBody>
-          <a:bodyPr wrap="square" rtlCol="0">
-            <a:spAutoFit/>
-          </a:bodyPr>
-          <a:lstStyle/>
-          <a:p>
-            <a:pPr algn="ctr"/>
-            <a:r>
-              <a:rPr lang="en-US" sz="1400" dirty="0">
-                <a:solidFill>
-                  <a:schemeClr val="accent1"/>
-                </a:solidFill>
-              </a:rPr>
-              <a:t>Contains</a:t>
-            </a:r>
-          </a:p>
-        </p:txBody>
-      </p:sp>
       <p:sp>
         <p:nvSpPr>
           <p:cNvPr id="46" name="TextBox 45">
@@ -6119,8 +5650,8 @@
           <p:nvPr/>
         </p:nvSpPr>
         <p:spPr>
-          <a:xfrm rot="4168542">
-            <a:off x="2652494" y="2560134"/>
+          <a:xfrm>
+            <a:off x="1692426" y="2642448"/>
             <a:ext cx="813871" cy="307777"/>
           </a:xfrm>
           <a:prstGeom prst="rect">
@@ -6150,149 +5681,6 @@
     <p:extLst>
       <p:ext uri="{BB962C8B-B14F-4D97-AF65-F5344CB8AC3E}">
         <p14:creationId xmlns:p14="http://schemas.microsoft.com/office/powerpoint/2010/main" val="3074153894"/>
-      </p:ext>
-    </p:extLst>
-  </p:cSld>
-  <p:clrMapOvr>
-    <a:masterClrMapping/>
-  </p:clrMapOvr>
-</p:sld>
-</file>
-
-<file path=ppt/slides/slide2.xml><?xml version="1.0" encoding="utf-8"?>
-<p:sld xmlns:a="http://schemas.openxmlformats.org/drawingml/2006/main" xmlns:r="http://schemas.openxmlformats.org/officeDocument/2006/relationships" xmlns:p="http://schemas.openxmlformats.org/presentationml/2006/main">
-  <p:cSld>
-    <p:spTree>
-      <p:nvGrpSpPr>
-        <p:cNvPr id="1" name=""/>
-        <p:cNvGrpSpPr/>
-        <p:nvPr/>
-      </p:nvGrpSpPr>
-      <p:grpSpPr>
-        <a:xfrm>
-          <a:off x="0" y="0"/>
-          <a:ext cx="0" cy="0"/>
-          <a:chOff x="0" y="0"/>
-          <a:chExt cx="0" cy="0"/>
-        </a:xfrm>
-      </p:grpSpPr>
-      <p:pic>
-        <p:nvPicPr>
-          <p:cNvPr id="5" name="Picture 4">
-            <a:extLst>
-              <a:ext uri="{FF2B5EF4-FFF2-40B4-BE49-F238E27FC236}">
-                <a16:creationId xmlns:a16="http://schemas.microsoft.com/office/drawing/2014/main" id="{3A94CF86-FAD2-486C-8AF4-FBBEA7E8DA4E}"/>
-              </a:ext>
-            </a:extLst>
-          </p:cNvPr>
-          <p:cNvPicPr>
-            <a:picLocks noChangeAspect="1"/>
-          </p:cNvPicPr>
-          <p:nvPr/>
-        </p:nvPicPr>
-        <p:blipFill>
-          <a:blip r:embed="rId2">
-            <a:extLst>
-              <a:ext uri="{28A0092B-C50C-407E-A947-70E740481C1C}">
-                <a14:useLocalDpi xmlns:a14="http://schemas.microsoft.com/office/drawing/2010/main" val="0"/>
-              </a:ext>
-            </a:extLst>
-          </a:blip>
-          <a:stretch>
-            <a:fillRect/>
-          </a:stretch>
-        </p:blipFill>
-        <p:spPr>
-          <a:xfrm>
-            <a:off x="0" y="0"/>
-            <a:ext cx="9144000" cy="6858000"/>
-          </a:xfrm>
-          <a:prstGeom prst="rect">
-            <a:avLst/>
-          </a:prstGeom>
-        </p:spPr>
-      </p:pic>
-    </p:spTree>
-    <p:extLst>
-      <p:ext uri="{BB962C8B-B14F-4D97-AF65-F5344CB8AC3E}">
-        <p14:creationId xmlns:p14="http://schemas.microsoft.com/office/powerpoint/2010/main" val="401697395"/>
-      </p:ext>
-    </p:extLst>
-  </p:cSld>
-  <p:clrMapOvr>
-    <a:masterClrMapping/>
-  </p:clrMapOvr>
-</p:sld>
-</file>
-
-<file path=ppt/slides/slide3.xml><?xml version="1.0" encoding="utf-8"?>
-<p:sld xmlns:a="http://schemas.openxmlformats.org/drawingml/2006/main" xmlns:r="http://schemas.openxmlformats.org/officeDocument/2006/relationships" xmlns:p="http://schemas.openxmlformats.org/presentationml/2006/main">
-  <p:cSld>
-    <p:spTree>
-      <p:nvGrpSpPr>
-        <p:cNvPr id="1" name=""/>
-        <p:cNvGrpSpPr/>
-        <p:nvPr/>
-      </p:nvGrpSpPr>
-      <p:grpSpPr>
-        <a:xfrm>
-          <a:off x="0" y="0"/>
-          <a:ext cx="0" cy="0"/>
-          <a:chOff x="0" y="0"/>
-          <a:chExt cx="0" cy="0"/>
-        </a:xfrm>
-      </p:grpSpPr>
-      <p:pic>
-        <p:nvPicPr>
-          <p:cNvPr id="1026" name="Picture 2" descr="Image result for texas holdem rules">
-            <a:extLst>
-              <a:ext uri="{FF2B5EF4-FFF2-40B4-BE49-F238E27FC236}">
-                <a16:creationId xmlns:a16="http://schemas.microsoft.com/office/drawing/2014/main" id="{F959644C-E62F-47BA-A686-473BF996136B}"/>
-              </a:ext>
-            </a:extLst>
-          </p:cNvPr>
-          <p:cNvPicPr>
-            <a:picLocks noChangeAspect="1" noChangeArrowheads="1"/>
-          </p:cNvPicPr>
-          <p:nvPr/>
-        </p:nvPicPr>
-        <p:blipFill>
-          <a:blip r:embed="rId2">
-            <a:extLst>
-              <a:ext uri="{28A0092B-C50C-407E-A947-70E740481C1C}">
-                <a14:useLocalDpi xmlns:a14="http://schemas.microsoft.com/office/drawing/2010/main" val="0"/>
-              </a:ext>
-            </a:extLst>
-          </a:blip>
-          <a:srcRect/>
-          <a:stretch>
-            <a:fillRect/>
-          </a:stretch>
-        </p:blipFill>
-        <p:spPr bwMode="auto">
-          <a:xfrm>
-            <a:off x="1691433" y="298028"/>
-            <a:ext cx="6055279" cy="6102772"/>
-          </a:xfrm>
-          <a:prstGeom prst="rect">
-            <a:avLst/>
-          </a:prstGeom>
-          <a:noFill/>
-          <a:extLst>
-            <a:ext uri="{909E8E84-426E-40DD-AFC4-6F175D3DCCD1}">
-              <a14:hiddenFill xmlns:a14="http://schemas.microsoft.com/office/drawing/2010/main">
-                <a:solidFill>
-                  <a:srgbClr val="FFFFFF"/>
-                </a:solidFill>
-              </a14:hiddenFill>
-            </a:ext>
-          </a:extLst>
-        </p:spPr>
-      </p:pic>
-    </p:spTree>
-    <p:extLst>
-      <p:ext uri="{BB962C8B-B14F-4D97-AF65-F5344CB8AC3E}">
-        <p14:creationId xmlns:p14="http://schemas.microsoft.com/office/powerpoint/2010/main" val="364726041"/>
       </p:ext>
     </p:extLst>
   </p:cSld>

</xml_diff>